<commit_message>
Remove legacy script mode and simplify remaining modes (#13971)
</commit_message>
<xml_diff>
--- a/source/images/integrations/script/script_figures.pptx
+++ b/source/images/integrations/script/script_figures.pptx
@@ -260,7 +260,7 @@
           <a:p>
             <a:fld id="{73520CA4-0A59-4CDD-9C73-C3AEFB40F766}" type="datetimeFigureOut">
               <a:rPr lang="en-US" smtClean="0"/>
-              <a:t>6/27/2020</a:t>
+              <a:t>7/10/2020</a:t>
             </a:fld>
             <a:endParaRPr lang="en-US"/>
           </a:p>
@@ -458,7 +458,7 @@
           <a:p>
             <a:fld id="{73520CA4-0A59-4CDD-9C73-C3AEFB40F766}" type="datetimeFigureOut">
               <a:rPr lang="en-US" smtClean="0"/>
-              <a:t>6/27/2020</a:t>
+              <a:t>7/10/2020</a:t>
             </a:fld>
             <a:endParaRPr lang="en-US"/>
           </a:p>
@@ -666,7 +666,7 @@
           <a:p>
             <a:fld id="{73520CA4-0A59-4CDD-9C73-C3AEFB40F766}" type="datetimeFigureOut">
               <a:rPr lang="en-US" smtClean="0"/>
-              <a:t>6/27/2020</a:t>
+              <a:t>7/10/2020</a:t>
             </a:fld>
             <a:endParaRPr lang="en-US"/>
           </a:p>
@@ -864,7 +864,7 @@
           <a:p>
             <a:fld id="{73520CA4-0A59-4CDD-9C73-C3AEFB40F766}" type="datetimeFigureOut">
               <a:rPr lang="en-US" smtClean="0"/>
-              <a:t>6/27/2020</a:t>
+              <a:t>7/10/2020</a:t>
             </a:fld>
             <a:endParaRPr lang="en-US"/>
           </a:p>
@@ -1139,7 +1139,7 @@
           <a:p>
             <a:fld id="{73520CA4-0A59-4CDD-9C73-C3AEFB40F766}" type="datetimeFigureOut">
               <a:rPr lang="en-US" smtClean="0"/>
-              <a:t>6/27/2020</a:t>
+              <a:t>7/10/2020</a:t>
             </a:fld>
             <a:endParaRPr lang="en-US"/>
           </a:p>
@@ -1404,7 +1404,7 @@
           <a:p>
             <a:fld id="{73520CA4-0A59-4CDD-9C73-C3AEFB40F766}" type="datetimeFigureOut">
               <a:rPr lang="en-US" smtClean="0"/>
-              <a:t>6/27/2020</a:t>
+              <a:t>7/10/2020</a:t>
             </a:fld>
             <a:endParaRPr lang="en-US"/>
           </a:p>
@@ -1816,7 +1816,7 @@
           <a:p>
             <a:fld id="{73520CA4-0A59-4CDD-9C73-C3AEFB40F766}" type="datetimeFigureOut">
               <a:rPr lang="en-US" smtClean="0"/>
-              <a:t>6/27/2020</a:t>
+              <a:t>7/10/2020</a:t>
             </a:fld>
             <a:endParaRPr lang="en-US"/>
           </a:p>
@@ -1957,7 +1957,7 @@
           <a:p>
             <a:fld id="{73520CA4-0A59-4CDD-9C73-C3AEFB40F766}" type="datetimeFigureOut">
               <a:rPr lang="en-US" smtClean="0"/>
-              <a:t>6/27/2020</a:t>
+              <a:t>7/10/2020</a:t>
             </a:fld>
             <a:endParaRPr lang="en-US"/>
           </a:p>
@@ -2070,7 +2070,7 @@
           <a:p>
             <a:fld id="{73520CA4-0A59-4CDD-9C73-C3AEFB40F766}" type="datetimeFigureOut">
               <a:rPr lang="en-US" smtClean="0"/>
-              <a:t>6/27/2020</a:t>
+              <a:t>7/10/2020</a:t>
             </a:fld>
             <a:endParaRPr lang="en-US"/>
           </a:p>
@@ -2381,7 +2381,7 @@
           <a:p>
             <a:fld id="{73520CA4-0A59-4CDD-9C73-C3AEFB40F766}" type="datetimeFigureOut">
               <a:rPr lang="en-US" smtClean="0"/>
-              <a:t>6/27/2020</a:t>
+              <a:t>7/10/2020</a:t>
             </a:fld>
             <a:endParaRPr lang="en-US"/>
           </a:p>
@@ -2669,7 +2669,7 @@
           <a:p>
             <a:fld id="{73520CA4-0A59-4CDD-9C73-C3AEFB40F766}" type="datetimeFigureOut">
               <a:rPr lang="en-US" smtClean="0"/>
-              <a:t>6/27/2020</a:t>
+              <a:t>7/10/2020</a:t>
             </a:fld>
             <a:endParaRPr lang="en-US"/>
           </a:p>
@@ -2910,7 +2910,7 @@
           <a:p>
             <a:fld id="{73520CA4-0A59-4CDD-9C73-C3AEFB40F766}" type="datetimeFigureOut">
               <a:rPr lang="en-US" smtClean="0"/>
-              <a:t>6/27/2020</a:t>
+              <a:t>7/10/2020</a:t>
             </a:fld>
             <a:endParaRPr lang="en-US"/>
           </a:p>
@@ -3378,8 +3378,8 @@
         </p:nvCxnSpPr>
         <p:spPr>
           <a:xfrm>
-            <a:off x="3669469" y="1351527"/>
-            <a:ext cx="0" cy="3022293"/>
+            <a:off x="3669469" y="1351528"/>
+            <a:ext cx="0" cy="2520464"/>
           </a:xfrm>
           <a:prstGeom prst="line">
             <a:avLst/>
@@ -3425,8 +3425,8 @@
         </p:nvCxnSpPr>
         <p:spPr>
           <a:xfrm flipH="1">
-            <a:off x="2945081" y="1351527"/>
-            <a:ext cx="1" cy="3007041"/>
+            <a:off x="2945082" y="1351528"/>
+            <a:ext cx="1" cy="2199967"/>
           </a:xfrm>
           <a:prstGeom prst="line">
             <a:avLst/>
@@ -3548,7 +3548,7 @@
         <p:spPr>
           <a:xfrm>
             <a:off x="3977745" y="1351528"/>
-            <a:ext cx="683072" cy="307777"/>
+            <a:ext cx="928331" cy="307777"/>
           </a:xfrm>
           <a:prstGeom prst="rect">
             <a:avLst/>
@@ -3563,7 +3563,7 @@
           <a:p>
             <a:r>
               <a:rPr lang="en-US" sz="1400" dirty="0"/>
-              <a:t>ERROR</a:t>
+              <a:t>WARNING</a:t>
             </a:r>
           </a:p>
         </p:txBody>
@@ -3582,10 +3582,10 @@
         </p:nvGrpSpPr>
         <p:grpSpPr>
           <a:xfrm>
-            <a:off x="2263530" y="1616300"/>
-            <a:ext cx="2563786" cy="369332"/>
-            <a:chOff x="2263530" y="1616300"/>
-            <a:chExt cx="2563786" cy="369332"/>
+            <a:off x="2195691" y="1616300"/>
+            <a:ext cx="2631625" cy="369332"/>
+            <a:chOff x="2195691" y="1616300"/>
+            <a:chExt cx="2631625" cy="369332"/>
           </a:xfrm>
         </p:grpSpPr>
         <p:sp>
@@ -3655,8 +3655,8 @@
           </p:nvSpPr>
           <p:spPr>
             <a:xfrm>
-              <a:off x="2263530" y="1616300"/>
-              <a:ext cx="658643" cy="369332"/>
+              <a:off x="2195691" y="1616300"/>
+              <a:ext cx="726482" cy="369332"/>
             </a:xfrm>
             <a:prstGeom prst="rect">
               <a:avLst/>
@@ -3672,117 +3672,7 @@
               <a:pPr algn="r"/>
               <a:r>
                 <a:rPr lang="en-US" dirty="0"/>
-                <a:t>error</a:t>
-              </a:r>
-            </a:p>
-          </p:txBody>
-        </p:sp>
-      </p:grpSp>
-      <p:grpSp>
-        <p:nvGrpSpPr>
-          <p:cNvPr id="3" name="Group 2">
-            <a:extLst>
-              <a:ext uri="{FF2B5EF4-FFF2-40B4-BE49-F238E27FC236}">
-                <a16:creationId xmlns:a16="http://schemas.microsoft.com/office/drawing/2014/main" id="{929FE94B-3E67-4602-855E-DF7DAB70B647}"/>
-              </a:ext>
-            </a:extLst>
-          </p:cNvPr>
-          <p:cNvGrpSpPr/>
-          <p:nvPr/>
-        </p:nvGrpSpPr>
-        <p:grpSpPr>
-          <a:xfrm>
-            <a:off x="2139394" y="2156103"/>
-            <a:ext cx="2687921" cy="369332"/>
-            <a:chOff x="2139394" y="2143555"/>
-            <a:chExt cx="2687921" cy="369332"/>
-          </a:xfrm>
-        </p:grpSpPr>
-        <p:sp>
-          <p:nvSpPr>
-            <p:cNvPr id="25" name="TextBox 24">
-              <a:extLst>
-                <a:ext uri="{FF2B5EF4-FFF2-40B4-BE49-F238E27FC236}">
-                  <a16:creationId xmlns:a16="http://schemas.microsoft.com/office/drawing/2014/main" id="{88CF26D4-2BD2-4BEF-B3D4-BB5DD83EBBEF}"/>
-                </a:ext>
-              </a:extLst>
-            </p:cNvPr>
-            <p:cNvSpPr txBox="1"/>
-            <p:nvPr/>
-          </p:nvSpPr>
-          <p:spPr>
-            <a:xfrm>
-              <a:off x="2139394" y="2143555"/>
-              <a:ext cx="782779" cy="369332"/>
-            </a:xfrm>
-            <a:prstGeom prst="rect">
-              <a:avLst/>
-            </a:prstGeom>
-            <a:noFill/>
-          </p:spPr>
-          <p:txBody>
-            <a:bodyPr wrap="none" rtlCol="0">
-              <a:spAutoFit/>
-            </a:bodyPr>
-            <a:lstStyle/>
-            <a:p>
-              <a:pPr algn="r"/>
-              <a:r>
-                <a:rPr lang="en-US" dirty="0"/>
-                <a:t>ignore</a:t>
-              </a:r>
-            </a:p>
-          </p:txBody>
-        </p:sp>
-        <p:sp>
-          <p:nvSpPr>
-            <p:cNvPr id="22" name="Rectangle 21">
-              <a:extLst>
-                <a:ext uri="{FF2B5EF4-FFF2-40B4-BE49-F238E27FC236}">
-                  <a16:creationId xmlns:a16="http://schemas.microsoft.com/office/drawing/2014/main" id="{9AE5132B-7DFD-49EB-925A-0305709971AE}"/>
-                </a:ext>
-              </a:extLst>
-            </p:cNvPr>
-            <p:cNvSpPr/>
-            <p:nvPr/>
-          </p:nvSpPr>
-          <p:spPr>
-            <a:xfrm>
-              <a:off x="2945076" y="2177099"/>
-              <a:ext cx="1882239" cy="314696"/>
-            </a:xfrm>
-            <a:prstGeom prst="rect">
-              <a:avLst/>
-            </a:prstGeom>
-          </p:spPr>
-          <p:style>
-            <a:lnRef idx="2">
-              <a:schemeClr val="dk1"/>
-            </a:lnRef>
-            <a:fillRef idx="1">
-              <a:schemeClr val="lt1"/>
-            </a:fillRef>
-            <a:effectRef idx="0">
-              <a:schemeClr val="dk1"/>
-            </a:effectRef>
-            <a:fontRef idx="minor">
-              <a:schemeClr val="dk1"/>
-            </a:fontRef>
-          </p:style>
-          <p:txBody>
-            <a:bodyPr rtlCol="0" anchor="ctr"/>
-            <a:lstStyle/>
-            <a:p>
-              <a:r>
-                <a:rPr lang="en-US" sz="1100" dirty="0"/>
-                <a:t>Actions</a:t>
-              </a:r>
-              <a:br>
-                <a:rPr lang="en-US" sz="1100" dirty="0"/>
-              </a:br>
-              <a:r>
-                <a:rPr lang="en-US" sz="1100" dirty="0"/>
-                <a:t>1     2     3     4     5     6     7     8</a:t>
+                <a:t>single</a:t>
               </a:r>
             </a:p>
           </p:txBody>
@@ -3802,7 +3692,7 @@
         </p:nvGrpSpPr>
         <p:grpSpPr>
           <a:xfrm>
-            <a:off x="2044947" y="2695906"/>
+            <a:off x="2044947" y="3240939"/>
             <a:ext cx="3506761" cy="630292"/>
             <a:chOff x="2044947" y="2666586"/>
             <a:chExt cx="3506761" cy="630292"/>
@@ -3965,7 +3855,7 @@
         </p:nvGrpSpPr>
         <p:grpSpPr>
           <a:xfrm>
-            <a:off x="2019362" y="4036470"/>
+            <a:off x="2019362" y="2699392"/>
             <a:ext cx="4690191" cy="369332"/>
             <a:chOff x="2019362" y="4036470"/>
             <a:chExt cx="4690191" cy="369332"/>
@@ -4124,7 +4014,7 @@
         </p:nvGrpSpPr>
         <p:grpSpPr>
           <a:xfrm>
-            <a:off x="2115928" y="3496669"/>
+            <a:off x="2115928" y="2157846"/>
             <a:ext cx="3435780" cy="369332"/>
             <a:chOff x="2115928" y="3454786"/>
             <a:chExt cx="3435780" cy="369332"/>

</xml_diff>